<commit_message>
Worked on chapter 7 and the appendix. Implemented Daniels final remark on the theory chapter and his remarks on the measurement chapter.
</commit_message>
<xml_diff>
--- a/material/figures/introduction/transmission_lines.pptx
+++ b/material/figures/introduction/transmission_lines.pptx
@@ -290,7 +290,7 @@
             <a:fld id="{90308D75-6CD1-47BF-9C58-4A834C045EAD}" type="datetimeFigureOut">
               <a:rPr lang="de-DE" smtClean="0"/>
               <a:pPr/>
-              <a:t>30.08.2012</a:t>
+              <a:t>12.09.2012</a:t>
             </a:fld>
             <a:endParaRPr lang="de-DE"/>
           </a:p>
@@ -457,7 +457,7 @@
             <a:fld id="{90308D75-6CD1-47BF-9C58-4A834C045EAD}" type="datetimeFigureOut">
               <a:rPr lang="de-DE" smtClean="0"/>
               <a:pPr/>
-              <a:t>30.08.2012</a:t>
+              <a:t>12.09.2012</a:t>
             </a:fld>
             <a:endParaRPr lang="de-DE"/>
           </a:p>
@@ -634,7 +634,7 @@
             <a:fld id="{90308D75-6CD1-47BF-9C58-4A834C045EAD}" type="datetimeFigureOut">
               <a:rPr lang="de-DE" smtClean="0"/>
               <a:pPr/>
-              <a:t>30.08.2012</a:t>
+              <a:t>12.09.2012</a:t>
             </a:fld>
             <a:endParaRPr lang="de-DE"/>
           </a:p>
@@ -801,7 +801,7 @@
             <a:fld id="{90308D75-6CD1-47BF-9C58-4A834C045EAD}" type="datetimeFigureOut">
               <a:rPr lang="de-DE" smtClean="0"/>
               <a:pPr/>
-              <a:t>30.08.2012</a:t>
+              <a:t>12.09.2012</a:t>
             </a:fld>
             <a:endParaRPr lang="de-DE"/>
           </a:p>
@@ -1044,7 +1044,7 @@
             <a:fld id="{90308D75-6CD1-47BF-9C58-4A834C045EAD}" type="datetimeFigureOut">
               <a:rPr lang="de-DE" smtClean="0"/>
               <a:pPr/>
-              <a:t>30.08.2012</a:t>
+              <a:t>12.09.2012</a:t>
             </a:fld>
             <a:endParaRPr lang="de-DE"/>
           </a:p>
@@ -1329,7 +1329,7 @@
             <a:fld id="{90308D75-6CD1-47BF-9C58-4A834C045EAD}" type="datetimeFigureOut">
               <a:rPr lang="de-DE" smtClean="0"/>
               <a:pPr/>
-              <a:t>30.08.2012</a:t>
+              <a:t>12.09.2012</a:t>
             </a:fld>
             <a:endParaRPr lang="de-DE"/>
           </a:p>
@@ -1748,7 +1748,7 @@
             <a:fld id="{90308D75-6CD1-47BF-9C58-4A834C045EAD}" type="datetimeFigureOut">
               <a:rPr lang="de-DE" smtClean="0"/>
               <a:pPr/>
-              <a:t>30.08.2012</a:t>
+              <a:t>12.09.2012</a:t>
             </a:fld>
             <a:endParaRPr lang="de-DE"/>
           </a:p>
@@ -1863,7 +1863,7 @@
             <a:fld id="{90308D75-6CD1-47BF-9C58-4A834C045EAD}" type="datetimeFigureOut">
               <a:rPr lang="de-DE" smtClean="0"/>
               <a:pPr/>
-              <a:t>30.08.2012</a:t>
+              <a:t>12.09.2012</a:t>
             </a:fld>
             <a:endParaRPr lang="de-DE"/>
           </a:p>
@@ -1955,7 +1955,7 @@
             <a:fld id="{90308D75-6CD1-47BF-9C58-4A834C045EAD}" type="datetimeFigureOut">
               <a:rPr lang="de-DE" smtClean="0"/>
               <a:pPr/>
-              <a:t>30.08.2012</a:t>
+              <a:t>12.09.2012</a:t>
             </a:fld>
             <a:endParaRPr lang="de-DE"/>
           </a:p>
@@ -2229,7 +2229,7 @@
             <a:fld id="{90308D75-6CD1-47BF-9C58-4A834C045EAD}" type="datetimeFigureOut">
               <a:rPr lang="de-DE" smtClean="0"/>
               <a:pPr/>
-              <a:t>30.08.2012</a:t>
+              <a:t>12.09.2012</a:t>
             </a:fld>
             <a:endParaRPr lang="de-DE"/>
           </a:p>
@@ -2479,7 +2479,7 @@
             <a:fld id="{90308D75-6CD1-47BF-9C58-4A834C045EAD}" type="datetimeFigureOut">
               <a:rPr lang="de-DE" smtClean="0"/>
               <a:pPr/>
-              <a:t>30.08.2012</a:t>
+              <a:t>12.09.2012</a:t>
             </a:fld>
             <a:endParaRPr lang="de-DE"/>
           </a:p>
@@ -2689,7 +2689,7 @@
             <a:fld id="{90308D75-6CD1-47BF-9C58-4A834C045EAD}" type="datetimeFigureOut">
               <a:rPr lang="de-DE" smtClean="0"/>
               <a:pPr/>
-              <a:t>30.08.2012</a:t>
+              <a:t>12.09.2012</a:t>
             </a:fld>
             <a:endParaRPr lang="de-DE"/>
           </a:p>

</xml_diff>